<commit_message>
fix: update sample app splash image
</commit_message>
<xml_diff>
--- a/docs/assets/banner.pptx
+++ b/docs/assets/banner.pptx
@@ -6,6 +6,7 @@
   </p:sldMasterIdLst>
   <p:sldIdLst>
     <p:sldId id="256" r:id="rId2"/>
+    <p:sldId id="257" r:id="rId3"/>
   </p:sldIdLst>
   <p:sldSz cx="12192000" cy="6858000"/>
   <p:notesSz cx="6858000" cy="9144000"/>
@@ -3990,6 +3991,198 @@
 </p:sld>
 </file>
 
+<file path=ppt/slides/slide2.xml><?xml version="1.0" encoding="utf-8"?>
+<p:sld xmlns:a="http://schemas.openxmlformats.org/drawingml/2006/main" xmlns:r="http://schemas.openxmlformats.org/officeDocument/2006/relationships" xmlns:p="http://schemas.openxmlformats.org/presentationml/2006/main">
+  <p:cSld>
+    <p:spTree>
+      <p:nvGrpSpPr>
+        <p:cNvPr id="1" name=""/>
+        <p:cNvGrpSpPr/>
+        <p:nvPr/>
+      </p:nvGrpSpPr>
+      <p:grpSpPr>
+        <a:xfrm>
+          <a:off x="0" y="0"/>
+          <a:ext cx="0" cy="0"/>
+          <a:chOff x="0" y="0"/>
+          <a:chExt cx="0" cy="0"/>
+        </a:xfrm>
+      </p:grpSpPr>
+      <p:sp>
+        <p:nvSpPr>
+          <p:cNvPr id="5" name="矩形 4">
+            <a:extLst>
+              <a:ext uri="{FF2B5EF4-FFF2-40B4-BE49-F238E27FC236}">
+                <a16:creationId xmlns:a16="http://schemas.microsoft.com/office/drawing/2014/main" id="{AA43872C-745E-9BDC-1F83-2B173756A34B}"/>
+              </a:ext>
+            </a:extLst>
+          </p:cNvPr>
+          <p:cNvSpPr/>
+          <p:nvPr/>
+        </p:nvSpPr>
+        <p:spPr>
+          <a:xfrm>
+            <a:off x="3179981" y="2967335"/>
+            <a:ext cx="5832046" cy="923330"/>
+          </a:xfrm>
+          <a:prstGeom prst="rect">
+            <a:avLst/>
+          </a:prstGeom>
+          <a:noFill/>
+        </p:spPr>
+        <p:txBody>
+          <a:bodyPr wrap="none" lIns="91440" tIns="45720" rIns="91440" bIns="45720">
+            <a:spAutoFit/>
+          </a:bodyPr>
+          <a:lstStyle/>
+          <a:p>
+            <a:pPr algn="ctr"/>
+            <a:r>
+              <a:rPr lang="en-US" altLang="zh-CN" sz="5400" b="1" dirty="0">
+                <a:ln w="6600">
+                  <a:solidFill>
+                    <a:schemeClr val="accent2"/>
+                  </a:solidFill>
+                  <a:prstDash val="solid"/>
+                </a:ln>
+                <a:solidFill>
+                  <a:srgbClr val="FFFFFF"/>
+                </a:solidFill>
+                <a:effectLst>
+                  <a:outerShdw dist="38100" dir="2700000" algn="tl" rotWithShape="0">
+                    <a:schemeClr val="accent2"/>
+                  </a:outerShdw>
+                </a:effectLst>
+              </a:rPr>
+              <a:t>V-Control Sample</a:t>
+            </a:r>
+            <a:endParaRPr lang="zh-CN" altLang="en-US" sz="5400" b="1" dirty="0">
+              <a:ln w="6600">
+                <a:solidFill>
+                  <a:schemeClr val="accent2"/>
+                </a:solidFill>
+                <a:prstDash val="solid"/>
+              </a:ln>
+              <a:solidFill>
+                <a:srgbClr val="FFFFFF"/>
+              </a:solidFill>
+              <a:effectLst>
+                <a:outerShdw dist="38100" dir="2700000" algn="tl" rotWithShape="0">
+                  <a:schemeClr val="accent2"/>
+                </a:outerShdw>
+              </a:effectLst>
+            </a:endParaRPr>
+          </a:p>
+        </p:txBody>
+      </p:sp>
+      <p:sp>
+        <p:nvSpPr>
+          <p:cNvPr id="2" name="矩形 1">
+            <a:extLst>
+              <a:ext uri="{FF2B5EF4-FFF2-40B4-BE49-F238E27FC236}">
+                <a16:creationId xmlns:a16="http://schemas.microsoft.com/office/drawing/2014/main" id="{F008BE45-8EC0-F223-9EAE-5C90A82FB945}"/>
+              </a:ext>
+            </a:extLst>
+          </p:cNvPr>
+          <p:cNvSpPr/>
+          <p:nvPr/>
+        </p:nvSpPr>
+        <p:spPr>
+          <a:xfrm>
+            <a:off x="3179981" y="489606"/>
+            <a:ext cx="3514104" cy="1754326"/>
+          </a:xfrm>
+          <a:prstGeom prst="rect">
+            <a:avLst/>
+          </a:prstGeom>
+          <a:noFill/>
+        </p:spPr>
+        <p:txBody>
+          <a:bodyPr wrap="none" lIns="91440" tIns="45720" rIns="91440" bIns="45720">
+            <a:spAutoFit/>
+          </a:bodyPr>
+          <a:lstStyle/>
+          <a:p>
+            <a:pPr algn="ctr"/>
+            <a:r>
+              <a:rPr lang="en-US" altLang="zh-CN" sz="5400" b="1" dirty="0">
+                <a:ln w="9525">
+                  <a:solidFill>
+                    <a:schemeClr val="bg1"/>
+                  </a:solidFill>
+                  <a:prstDash val="solid"/>
+                </a:ln>
+                <a:solidFill>
+                  <a:srgbClr val="FF781B"/>
+                </a:solidFill>
+                <a:effectLst>
+                  <a:outerShdw blurRad="12700" dist="38100" dir="2700000" algn="tl" rotWithShape="0">
+                    <a:schemeClr val="bg1">
+                      <a:lumMod val="50000"/>
+                    </a:schemeClr>
+                  </a:outerShdw>
+                </a:effectLst>
+              </a:rPr>
+              <a:t>V-Control </a:t>
+            </a:r>
+          </a:p>
+          <a:p>
+            <a:pPr algn="ctr"/>
+            <a:r>
+              <a:rPr lang="en-US" altLang="zh-CN" sz="5400" b="1">
+                <a:ln w="9525">
+                  <a:solidFill>
+                    <a:schemeClr val="bg1"/>
+                  </a:solidFill>
+                  <a:prstDash val="solid"/>
+                </a:ln>
+                <a:solidFill>
+                  <a:srgbClr val="FF781B"/>
+                </a:solidFill>
+                <a:effectLst>
+                  <a:outerShdw blurRad="12700" dist="38100" dir="2700000" algn="tl" rotWithShape="0">
+                    <a:schemeClr val="bg1">
+                      <a:lumMod val="50000"/>
+                    </a:schemeClr>
+                  </a:outerShdw>
+                </a:effectLst>
+              </a:rPr>
+              <a:t>Samples</a:t>
+            </a:r>
+            <a:endParaRPr lang="zh-CN" altLang="en-US" sz="5400" b="1" dirty="0">
+              <a:ln w="9525">
+                <a:solidFill>
+                  <a:schemeClr val="bg1"/>
+                </a:solidFill>
+                <a:prstDash val="solid"/>
+              </a:ln>
+              <a:solidFill>
+                <a:srgbClr val="FF781B"/>
+              </a:solidFill>
+              <a:effectLst>
+                <a:outerShdw blurRad="12700" dist="38100" dir="2700000" algn="tl" rotWithShape="0">
+                  <a:schemeClr val="bg1">
+                    <a:lumMod val="50000"/>
+                  </a:schemeClr>
+                </a:outerShdw>
+              </a:effectLst>
+            </a:endParaRPr>
+          </a:p>
+        </p:txBody>
+      </p:sp>
+    </p:spTree>
+    <p:extLst>
+      <p:ext uri="{BB962C8B-B14F-4D97-AF65-F5344CB8AC3E}">
+        <p14:creationId xmlns:p14="http://schemas.microsoft.com/office/powerpoint/2010/main" val="4083759908"/>
+      </p:ext>
+    </p:extLst>
+  </p:cSld>
+  <p:clrMapOvr>
+    <a:masterClrMapping/>
+  </p:clrMapOvr>
+</p:sld>
+</file>
+
 <file path=ppt/theme/theme1.xml><?xml version="1.0" encoding="utf-8"?>
 <a:theme xmlns:a="http://schemas.openxmlformats.org/drawingml/2006/main" name="Office 主题​​">
   <a:themeElements>

</xml_diff>